<commit_message>
First V3 Data: finalize figs for EEG Hacker post
</commit_message>
<xml_diff>
--- a/Data/2014-08-17 First V3 Data/Pics/Figures.pptx
+++ b/Data/2014-08-17 First V3 Data/Pics/Figures.pptx
@@ -5,8 +5,10 @@
     <p:sldMasterId id="2147483648" r:id="rId1"/>
   </p:sldMasterIdLst>
   <p:sldIdLst>
-    <p:sldId id="256" r:id="rId2"/>
-    <p:sldId id="257" r:id="rId3"/>
+    <p:sldId id="258" r:id="rId2"/>
+    <p:sldId id="259" r:id="rId3"/>
+    <p:sldId id="256" r:id="rId4"/>
+    <p:sldId id="260" r:id="rId5"/>
   </p:sldIdLst>
   <p:sldSz cx="9144000" cy="6858000" type="screen4x3"/>
   <p:notesSz cx="6858000" cy="9144000"/>
@@ -289,7 +291,7 @@
           <a:p>
             <a:fld id="{DACFF7B1-B6F3-48FA-BD5A-AB9BFD8886F5}" type="datetimeFigureOut">
               <a:rPr lang="en-US" smtClean="0"/>
-              <a:t>8/17/2014</a:t>
+              <a:t>8/18/2014</a:t>
             </a:fld>
             <a:endParaRPr lang="en-US"/>
           </a:p>
@@ -459,7 +461,7 @@
           <a:p>
             <a:fld id="{DACFF7B1-B6F3-48FA-BD5A-AB9BFD8886F5}" type="datetimeFigureOut">
               <a:rPr lang="en-US" smtClean="0"/>
-              <a:t>8/17/2014</a:t>
+              <a:t>8/18/2014</a:t>
             </a:fld>
             <a:endParaRPr lang="en-US"/>
           </a:p>
@@ -639,7 +641,7 @@
           <a:p>
             <a:fld id="{DACFF7B1-B6F3-48FA-BD5A-AB9BFD8886F5}" type="datetimeFigureOut">
               <a:rPr lang="en-US" smtClean="0"/>
-              <a:t>8/17/2014</a:t>
+              <a:t>8/18/2014</a:t>
             </a:fld>
             <a:endParaRPr lang="en-US"/>
           </a:p>
@@ -809,7 +811,7 @@
           <a:p>
             <a:fld id="{DACFF7B1-B6F3-48FA-BD5A-AB9BFD8886F5}" type="datetimeFigureOut">
               <a:rPr lang="en-US" smtClean="0"/>
-              <a:t>8/17/2014</a:t>
+              <a:t>8/18/2014</a:t>
             </a:fld>
             <a:endParaRPr lang="en-US"/>
           </a:p>
@@ -1055,7 +1057,7 @@
           <a:p>
             <a:fld id="{DACFF7B1-B6F3-48FA-BD5A-AB9BFD8886F5}" type="datetimeFigureOut">
               <a:rPr lang="en-US" smtClean="0"/>
-              <a:t>8/17/2014</a:t>
+              <a:t>8/18/2014</a:t>
             </a:fld>
             <a:endParaRPr lang="en-US"/>
           </a:p>
@@ -1343,7 +1345,7 @@
           <a:p>
             <a:fld id="{DACFF7B1-B6F3-48FA-BD5A-AB9BFD8886F5}" type="datetimeFigureOut">
               <a:rPr lang="en-US" smtClean="0"/>
-              <a:t>8/17/2014</a:t>
+              <a:t>8/18/2014</a:t>
             </a:fld>
             <a:endParaRPr lang="en-US"/>
           </a:p>
@@ -1765,7 +1767,7 @@
           <a:p>
             <a:fld id="{DACFF7B1-B6F3-48FA-BD5A-AB9BFD8886F5}" type="datetimeFigureOut">
               <a:rPr lang="en-US" smtClean="0"/>
-              <a:t>8/17/2014</a:t>
+              <a:t>8/18/2014</a:t>
             </a:fld>
             <a:endParaRPr lang="en-US"/>
           </a:p>
@@ -1883,7 +1885,7 @@
           <a:p>
             <a:fld id="{DACFF7B1-B6F3-48FA-BD5A-AB9BFD8886F5}" type="datetimeFigureOut">
               <a:rPr lang="en-US" smtClean="0"/>
-              <a:t>8/17/2014</a:t>
+              <a:t>8/18/2014</a:t>
             </a:fld>
             <a:endParaRPr lang="en-US"/>
           </a:p>
@@ -1978,7 +1980,7 @@
           <a:p>
             <a:fld id="{DACFF7B1-B6F3-48FA-BD5A-AB9BFD8886F5}" type="datetimeFigureOut">
               <a:rPr lang="en-US" smtClean="0"/>
-              <a:t>8/17/2014</a:t>
+              <a:t>8/18/2014</a:t>
             </a:fld>
             <a:endParaRPr lang="en-US"/>
           </a:p>
@@ -2255,7 +2257,7 @@
           <a:p>
             <a:fld id="{DACFF7B1-B6F3-48FA-BD5A-AB9BFD8886F5}" type="datetimeFigureOut">
               <a:rPr lang="en-US" smtClean="0"/>
-              <a:t>8/17/2014</a:t>
+              <a:t>8/18/2014</a:t>
             </a:fld>
             <a:endParaRPr lang="en-US"/>
           </a:p>
@@ -2508,7 +2510,7 @@
           <a:p>
             <a:fld id="{DACFF7B1-B6F3-48FA-BD5A-AB9BFD8886F5}" type="datetimeFigureOut">
               <a:rPr lang="en-US" smtClean="0"/>
-              <a:t>8/17/2014</a:t>
+              <a:t>8/18/2014</a:t>
             </a:fld>
             <a:endParaRPr lang="en-US"/>
           </a:p>
@@ -2721,7 +2723,7 @@
           <a:p>
             <a:fld id="{DACFF7B1-B6F3-48FA-BD5A-AB9BFD8886F5}" type="datetimeFigureOut">
               <a:rPr lang="en-US" smtClean="0"/>
-              <a:t>8/17/2014</a:t>
+              <a:t>8/18/2014</a:t>
             </a:fld>
             <a:endParaRPr lang="en-US"/>
           </a:p>
@@ -3096,44 +3098,6 @@
           <a:chExt cx="0" cy="0"/>
         </a:xfrm>
       </p:grpSpPr>
-      <p:sp>
-        <p:nvSpPr>
-          <p:cNvPr id="2" name="Title 1"/>
-          <p:cNvSpPr>
-            <a:spLocks noGrp="1"/>
-          </p:cNvSpPr>
-          <p:nvPr>
-            <p:ph type="ctrTitle"/>
-          </p:nvPr>
-        </p:nvSpPr>
-        <p:spPr/>
-        <p:txBody>
-          <a:bodyPr/>
-          <a:lstStyle/>
-          <a:p>
-            <a:endParaRPr lang="en-US"/>
-          </a:p>
-        </p:txBody>
-      </p:sp>
-      <p:sp>
-        <p:nvSpPr>
-          <p:cNvPr id="3" name="Subtitle 2"/>
-          <p:cNvSpPr>
-            <a:spLocks noGrp="1"/>
-          </p:cNvSpPr>
-          <p:nvPr>
-            <p:ph type="subTitle" idx="1"/>
-          </p:nvPr>
-        </p:nvSpPr>
-        <p:spPr/>
-        <p:txBody>
-          <a:bodyPr/>
-          <a:lstStyle/>
-          <a:p>
-            <a:endParaRPr lang="en-US"/>
-          </a:p>
-        </p:txBody>
-      </p:sp>
       <p:pic>
         <p:nvPicPr>
           <p:cNvPr id="1026" name="Picture 2"/>
@@ -3157,7 +3121,254 @@
         </p:blipFill>
         <p:spPr bwMode="auto">
           <a:xfrm>
-            <a:off x="3243" y="494489"/>
+            <a:off x="-30804" y="457200"/>
+            <a:ext cx="9144000" cy="5715000"/>
+          </a:xfrm>
+          <a:prstGeom prst="rect">
+            <a:avLst/>
+          </a:prstGeom>
+          <a:noFill/>
+          <a:ln>
+            <a:noFill/>
+          </a:ln>
+          <a:effectLst/>
+          <a:extLst>
+            <a:ext uri="{909E8E84-426E-40DD-AFC4-6F175D3DCCD1}">
+              <a14:hiddenFill xmlns:a14="http://schemas.microsoft.com/office/drawing/2010/main">
+                <a:solidFill>
+                  <a:schemeClr val="accent1"/>
+                </a:solidFill>
+              </a14:hiddenFill>
+            </a:ext>
+            <a:ext uri="{91240B29-F687-4F45-9708-019B960494DF}">
+              <a14:hiddenLine xmlns:a14="http://schemas.microsoft.com/office/drawing/2010/main" w="9525">
+                <a:solidFill>
+                  <a:schemeClr val="tx1"/>
+                </a:solidFill>
+                <a:miter lim="800000"/>
+                <a:headEnd/>
+                <a:tailEnd/>
+              </a14:hiddenLine>
+            </a:ext>
+            <a:ext uri="{AF507438-7753-43E0-B8FC-AC1667EBCBE1}">
+              <a14:hiddenEffects xmlns:a14="http://schemas.microsoft.com/office/drawing/2010/main">
+                <a:effectLst>
+                  <a:outerShdw dist="35921" dir="2700000" algn="ctr" rotWithShape="0">
+                    <a:schemeClr val="bg2"/>
+                  </a:outerShdw>
+                </a:effectLst>
+              </a14:hiddenEffects>
+            </a:ext>
+          </a:extLst>
+        </p:spPr>
+      </p:pic>
+    </p:spTree>
+    <p:extLst>
+      <p:ext uri="{BB962C8B-B14F-4D97-AF65-F5344CB8AC3E}">
+        <p14:creationId xmlns:p14="http://schemas.microsoft.com/office/powerpoint/2010/main" val="1394154639"/>
+      </p:ext>
+    </p:extLst>
+  </p:cSld>
+  <p:clrMapOvr>
+    <a:masterClrMapping/>
+  </p:clrMapOvr>
+</p:sld>
+</file>
+
+<file path=ppt/slides/slide2.xml><?xml version="1.0" encoding="utf-8"?>
+<p:sld xmlns:a="http://schemas.openxmlformats.org/drawingml/2006/main" xmlns:r="http://schemas.openxmlformats.org/officeDocument/2006/relationships" xmlns:p="http://schemas.openxmlformats.org/presentationml/2006/main">
+  <p:cSld>
+    <p:spTree>
+      <p:nvGrpSpPr>
+        <p:cNvPr id="1" name=""/>
+        <p:cNvGrpSpPr/>
+        <p:nvPr/>
+      </p:nvGrpSpPr>
+      <p:grpSpPr>
+        <a:xfrm>
+          <a:off x="0" y="0"/>
+          <a:ext cx="0" cy="0"/>
+          <a:chOff x="0" y="0"/>
+          <a:chExt cx="0" cy="0"/>
+        </a:xfrm>
+      </p:grpSpPr>
+      <p:grpSp>
+        <p:nvGrpSpPr>
+          <p:cNvPr id="3" name="Group 2"/>
+          <p:cNvGrpSpPr/>
+          <p:nvPr/>
+        </p:nvGrpSpPr>
+        <p:grpSpPr>
+          <a:xfrm>
+            <a:off x="2490280" y="1828800"/>
+            <a:ext cx="4260715" cy="2748064"/>
+            <a:chOff x="2490280" y="1828800"/>
+            <a:chExt cx="4260715" cy="2748064"/>
+          </a:xfrm>
+        </p:grpSpPr>
+        <p:sp>
+          <p:nvSpPr>
+            <p:cNvPr id="2" name="Rectangle 1"/>
+            <p:cNvSpPr/>
+            <p:nvPr/>
+          </p:nvSpPr>
+          <p:spPr>
+            <a:xfrm>
+              <a:off x="2490280" y="1828800"/>
+              <a:ext cx="4260715" cy="2748064"/>
+            </a:xfrm>
+            <a:prstGeom prst="rect">
+              <a:avLst/>
+            </a:prstGeom>
+            <a:solidFill>
+              <a:schemeClr val="bg1"/>
+            </a:solidFill>
+            <a:ln>
+              <a:noFill/>
+            </a:ln>
+          </p:spPr>
+          <p:style>
+            <a:lnRef idx="2">
+              <a:schemeClr val="accent1">
+                <a:shade val="50000"/>
+              </a:schemeClr>
+            </a:lnRef>
+            <a:fillRef idx="1">
+              <a:schemeClr val="accent1"/>
+            </a:fillRef>
+            <a:effectRef idx="0">
+              <a:schemeClr val="accent1"/>
+            </a:effectRef>
+            <a:fontRef idx="minor">
+              <a:schemeClr val="lt1"/>
+            </a:fontRef>
+          </p:style>
+          <p:txBody>
+            <a:bodyPr rtlCol="0" anchor="ctr"/>
+            <a:lstStyle/>
+            <a:p>
+              <a:pPr algn="ctr"/>
+              <a:endParaRPr lang="en-US"/>
+            </a:p>
+          </p:txBody>
+        </p:sp>
+        <p:pic>
+          <p:nvPicPr>
+            <p:cNvPr id="1026" name="Picture 2"/>
+            <p:cNvPicPr>
+              <a:picLocks noChangeAspect="1" noChangeArrowheads="1"/>
+            </p:cNvPicPr>
+            <p:nvPr/>
+          </p:nvPicPr>
+          <p:blipFill rotWithShape="1">
+            <a:blip r:embed="rId2">
+              <a:extLst>
+                <a:ext uri="{28A0092B-C50C-407E-A947-70E740481C1C}">
+                  <a14:useLocalDpi xmlns:a14="http://schemas.microsoft.com/office/drawing/2010/main" val="0"/>
+                </a:ext>
+              </a:extLst>
+            </a:blip>
+            <a:srcRect l="50869" t="51915" r="2536"/>
+            <a:stretch/>
+          </p:blipFill>
+          <p:spPr bwMode="auto">
+            <a:xfrm>
+              <a:off x="2490280" y="1828800"/>
+              <a:ext cx="4260715" cy="2748064"/>
+            </a:xfrm>
+            <a:prstGeom prst="rect">
+              <a:avLst/>
+            </a:prstGeom>
+            <a:noFill/>
+            <a:ln>
+              <a:noFill/>
+            </a:ln>
+            <a:effectLst/>
+            <a:extLst>
+              <a:ext uri="{909E8E84-426E-40DD-AFC4-6F175D3DCCD1}">
+                <a14:hiddenFill xmlns:a14="http://schemas.microsoft.com/office/drawing/2010/main">
+                  <a:solidFill>
+                    <a:schemeClr val="accent1"/>
+                  </a:solidFill>
+                </a14:hiddenFill>
+              </a:ext>
+              <a:ext uri="{91240B29-F687-4F45-9708-019B960494DF}">
+                <a14:hiddenLine xmlns:a14="http://schemas.microsoft.com/office/drawing/2010/main" w="9525">
+                  <a:solidFill>
+                    <a:schemeClr val="tx1"/>
+                  </a:solidFill>
+                  <a:miter lim="800000"/>
+                  <a:headEnd/>
+                  <a:tailEnd/>
+                </a14:hiddenLine>
+              </a:ext>
+              <a:ext uri="{AF507438-7753-43E0-B8FC-AC1667EBCBE1}">
+                <a14:hiddenEffects xmlns:a14="http://schemas.microsoft.com/office/drawing/2010/main">
+                  <a:effectLst>
+                    <a:outerShdw dist="35921" dir="2700000" algn="ctr" rotWithShape="0">
+                      <a:schemeClr val="bg2"/>
+                    </a:outerShdw>
+                  </a:effectLst>
+                </a14:hiddenEffects>
+              </a:ext>
+            </a:extLst>
+          </p:spPr>
+        </p:pic>
+      </p:grpSp>
+    </p:spTree>
+    <p:extLst>
+      <p:ext uri="{BB962C8B-B14F-4D97-AF65-F5344CB8AC3E}">
+        <p14:creationId xmlns:p14="http://schemas.microsoft.com/office/powerpoint/2010/main" val="3987097909"/>
+      </p:ext>
+    </p:extLst>
+  </p:cSld>
+  <p:clrMapOvr>
+    <a:masterClrMapping/>
+  </p:clrMapOvr>
+</p:sld>
+</file>
+
+<file path=ppt/slides/slide3.xml><?xml version="1.0" encoding="utf-8"?>
+<p:sld xmlns:a="http://schemas.openxmlformats.org/drawingml/2006/main" xmlns:r="http://schemas.openxmlformats.org/officeDocument/2006/relationships" xmlns:p="http://schemas.openxmlformats.org/presentationml/2006/main">
+  <p:cSld>
+    <p:spTree>
+      <p:nvGrpSpPr>
+        <p:cNvPr id="1" name=""/>
+        <p:cNvGrpSpPr/>
+        <p:nvPr/>
+      </p:nvGrpSpPr>
+      <p:grpSpPr>
+        <a:xfrm>
+          <a:off x="0" y="0"/>
+          <a:ext cx="0" cy="0"/>
+          <a:chOff x="0" y="0"/>
+          <a:chExt cx="0" cy="0"/>
+        </a:xfrm>
+      </p:grpSpPr>
+      <p:pic>
+        <p:nvPicPr>
+          <p:cNvPr id="2050" name="Picture 2"/>
+          <p:cNvPicPr>
+            <a:picLocks noChangeAspect="1" noChangeArrowheads="1"/>
+          </p:cNvPicPr>
+          <p:nvPr/>
+        </p:nvPicPr>
+        <p:blipFill>
+          <a:blip r:embed="rId2">
+            <a:extLst>
+              <a:ext uri="{28A0092B-C50C-407E-A947-70E740481C1C}">
+                <a14:useLocalDpi xmlns:a14="http://schemas.microsoft.com/office/drawing/2010/main" val="0"/>
+              </a:ext>
+            </a:extLst>
+          </a:blip>
+          <a:srcRect/>
+          <a:stretch>
+            <a:fillRect/>
+          </a:stretch>
+        </p:blipFill>
+        <p:spPr bwMode="auto">
+          <a:xfrm>
+            <a:off x="-35668" y="457200"/>
             <a:ext cx="9144000" cy="5715000"/>
           </a:xfrm>
           <a:prstGeom prst="rect">
@@ -3211,7 +3422,7 @@
 </p:sld>
 </file>
 
-<file path=ppt/slides/slide2.xml><?xml version="1.0" encoding="utf-8"?>
+<file path=ppt/slides/slide4.xml><?xml version="1.0" encoding="utf-8"?>
 <p:sld xmlns:a="http://schemas.openxmlformats.org/drawingml/2006/main" xmlns:r="http://schemas.openxmlformats.org/officeDocument/2006/relationships" xmlns:p="http://schemas.openxmlformats.org/presentationml/2006/main">
   <p:cSld>
     <p:spTree>
@@ -3230,28 +3441,28 @@
       </p:grpSpPr>
       <p:grpSp>
         <p:nvGrpSpPr>
-          <p:cNvPr id="5" name="Group 4"/>
+          <p:cNvPr id="3" name="Group 2"/>
           <p:cNvGrpSpPr/>
           <p:nvPr/>
         </p:nvGrpSpPr>
         <p:grpSpPr>
           <a:xfrm>
-            <a:off x="2590799" y="1676400"/>
-            <a:ext cx="4178461" cy="2725509"/>
-            <a:chOff x="2590799" y="1676400"/>
-            <a:chExt cx="4178461" cy="2725509"/>
+            <a:off x="2209800" y="1600200"/>
+            <a:ext cx="4231533" cy="2738336"/>
+            <a:chOff x="2209800" y="1600200"/>
+            <a:chExt cx="4231533" cy="2738336"/>
           </a:xfrm>
         </p:grpSpPr>
         <p:sp>
           <p:nvSpPr>
-            <p:cNvPr id="4" name="Rectangle 3"/>
+            <p:cNvPr id="2" name="Rectangle 1"/>
             <p:cNvSpPr/>
             <p:nvPr/>
           </p:nvSpPr>
           <p:spPr>
             <a:xfrm>
-              <a:off x="2590799" y="1676400"/>
-              <a:ext cx="4178461" cy="2725509"/>
+              <a:off x="2209800" y="1600200"/>
+              <a:ext cx="4231533" cy="2738336"/>
             </a:xfrm>
             <a:prstGeom prst="rect">
               <a:avLst/>
@@ -3290,7 +3501,7 @@
         </p:sp>
         <p:pic>
           <p:nvPicPr>
-            <p:cNvPr id="1026" name="Picture 2"/>
+            <p:cNvPr id="2050" name="Picture 2"/>
             <p:cNvPicPr>
               <a:picLocks noChangeAspect="1" noChangeArrowheads="1"/>
             </p:cNvPicPr>
@@ -3304,13 +3515,13 @@
                 </a:ext>
               </a:extLst>
             </a:blip>
-            <a:srcRect l="51736" t="52310" r="2568"/>
+            <a:srcRect l="51880" t="52085" r="1844"/>
             <a:stretch/>
           </p:blipFill>
           <p:spPr bwMode="auto">
             <a:xfrm>
-              <a:off x="2590799" y="1676400"/>
-              <a:ext cx="4178461" cy="2725509"/>
+              <a:off x="2209800" y="1600200"/>
+              <a:ext cx="4231533" cy="2738336"/>
             </a:xfrm>
             <a:prstGeom prst="rect">
               <a:avLst/>
@@ -3354,7 +3565,7 @@
     </p:spTree>
     <p:extLst>
       <p:ext uri="{BB962C8B-B14F-4D97-AF65-F5344CB8AC3E}">
-        <p14:creationId xmlns:p14="http://schemas.microsoft.com/office/powerpoint/2010/main" val="1314037123"/>
+        <p14:creationId xmlns:p14="http://schemas.microsoft.com/office/powerpoint/2010/main" val="2972288931"/>
       </p:ext>
     </p:extLst>
   </p:cSld>

</xml_diff>